<commit_message>
fix 0.2[s] -> 0.24[s]
</commit_message>
<xml_diff>
--- a/suction_UntilSeptember/suction_velocity2(gridsize0.5)_stationary/suction_velocity2(gridsize0.5)_stationary.pptx
+++ b/suction_UntilSeptember/suction_velocity2(gridsize0.5)_stationary/suction_velocity2(gridsize0.5)_stationary.pptx
@@ -191,7 +191,6 @@
           </a:p>
         </c:rich>
       </c:tx>
-      <c:layout/>
       <c:overlay val="0"/>
       <c:spPr>
         <a:noFill/>
@@ -597,11 +596,11 @@
             <a:effectLst/>
           </c:spPr>
         </c:serLines>
-        <c:axId val="185491632"/>
-        <c:axId val="185492192"/>
+        <c:axId val="187115968"/>
+        <c:axId val="399501200"/>
       </c:barChart>
       <c:catAx>
-        <c:axId val="185491632"/>
+        <c:axId val="187115968"/>
         <c:scaling>
           <c:orientation val="minMax"/>
         </c:scaling>
@@ -644,7 +643,7 @@
             <a:endParaRPr lang="ja-JP"/>
           </a:p>
         </c:txPr>
-        <c:crossAx val="185492192"/>
+        <c:crossAx val="399501200"/>
         <c:crosses val="autoZero"/>
         <c:auto val="1"/>
         <c:lblAlgn val="ctr"/>
@@ -652,7 +651,7 @@
         <c:noMultiLvlLbl val="0"/>
       </c:catAx>
       <c:valAx>
-        <c:axId val="185492192"/>
+        <c:axId val="399501200"/>
         <c:scaling>
           <c:orientation val="minMax"/>
         </c:scaling>
@@ -703,7 +702,7 @@
             <a:endParaRPr lang="ja-JP"/>
           </a:p>
         </c:txPr>
-        <c:crossAx val="185491632"/>
+        <c:crossAx val="187115968"/>
         <c:crosses val="autoZero"/>
         <c:crossBetween val="between"/>
       </c:valAx>
@@ -851,11 +850,11 @@
           <c:showPercent val="0"/>
           <c:showBubbleSize val="0"/>
         </c:dLbls>
-        <c:axId val="189205152"/>
-        <c:axId val="189205712"/>
+        <c:axId val="187018752"/>
+        <c:axId val="298818672"/>
       </c:scatterChart>
       <c:valAx>
-        <c:axId val="189205152"/>
+        <c:axId val="187018752"/>
         <c:scaling>
           <c:orientation val="minMax"/>
           <c:max val="300"/>
@@ -894,7 +893,6 @@
               </a:p>
             </c:rich>
           </c:tx>
-          <c:layout/>
           <c:overlay val="0"/>
           <c:spPr>
             <a:noFill/>
@@ -961,12 +959,12 @@
             <a:endParaRPr lang="ja-JP"/>
           </a:p>
         </c:txPr>
-        <c:crossAx val="189205712"/>
+        <c:crossAx val="298818672"/>
         <c:crosses val="autoZero"/>
         <c:crossBetween val="midCat"/>
       </c:valAx>
       <c:valAx>
-        <c:axId val="189205712"/>
+        <c:axId val="298818672"/>
         <c:scaling>
           <c:orientation val="minMax"/>
         </c:scaling>
@@ -1090,7 +1088,7 @@
             <a:endParaRPr lang="ja-JP"/>
           </a:p>
         </c:txPr>
-        <c:crossAx val="189205152"/>
+        <c:crossAx val="187018752"/>
         <c:crosses val="autoZero"/>
         <c:crossBetween val="midCat"/>
       </c:valAx>
@@ -1507,11 +1505,11 @@
             <a:effectLst/>
           </c:spPr>
         </c:serLines>
-        <c:axId val="186297920"/>
-        <c:axId val="186298480"/>
+        <c:axId val="300503136"/>
+        <c:axId val="300503696"/>
       </c:barChart>
       <c:catAx>
-        <c:axId val="186297920"/>
+        <c:axId val="300503136"/>
         <c:scaling>
           <c:orientation val="minMax"/>
         </c:scaling>
@@ -1554,7 +1552,7 @@
             <a:endParaRPr lang="ja-JP"/>
           </a:p>
         </c:txPr>
-        <c:crossAx val="186298480"/>
+        <c:crossAx val="300503696"/>
         <c:crosses val="autoZero"/>
         <c:auto val="1"/>
         <c:lblAlgn val="ctr"/>
@@ -1562,7 +1560,7 @@
         <c:noMultiLvlLbl val="0"/>
       </c:catAx>
       <c:valAx>
-        <c:axId val="186298480"/>
+        <c:axId val="300503696"/>
         <c:scaling>
           <c:orientation val="minMax"/>
         </c:scaling>
@@ -1613,7 +1611,7 @@
             <a:endParaRPr lang="ja-JP"/>
           </a:p>
         </c:txPr>
-        <c:crossAx val="186297920"/>
+        <c:crossAx val="300503136"/>
         <c:crosses val="autoZero"/>
         <c:crossBetween val="between"/>
       </c:valAx>
@@ -3380,7 +3378,7 @@
           <a:p>
             <a:fld id="{D052FF8A-4899-49C0-8C60-4DC8CBEDC3E6}" type="datetimeFigureOut">
               <a:rPr kumimoji="1" lang="ja-JP" altLang="en-US" smtClean="0"/>
-              <a:t>2018/9/27</a:t>
+              <a:t>2018/10/9</a:t>
             </a:fld>
             <a:endParaRPr kumimoji="1" lang="ja-JP" altLang="en-US"/>
           </a:p>
@@ -3841,7 +3839,7 @@
           <a:p>
             <a:fld id="{18DCCD61-643D-44A5-A450-3A42A50CBC1E}" type="datetimeFigureOut">
               <a:rPr lang="en-US" smtClean="0"/>
-              <a:t>9/27/2018</a:t>
+              <a:t>10/9/2018</a:t>
             </a:fld>
             <a:endParaRPr lang="en-US"/>
           </a:p>
@@ -4116,7 +4114,7 @@
           <a:p>
             <a:fld id="{18DCCD61-643D-44A5-A450-3A42A50CBC1E}" type="datetimeFigureOut">
               <a:rPr lang="en-US" smtClean="0"/>
-              <a:t>9/27/2018</a:t>
+              <a:t>10/9/2018</a:t>
             </a:fld>
             <a:endParaRPr lang="en-US"/>
           </a:p>
@@ -4368,7 +4366,7 @@
           <a:p>
             <a:fld id="{18DCCD61-643D-44A5-A450-3A42A50CBC1E}" type="datetimeFigureOut">
               <a:rPr lang="en-US" smtClean="0"/>
-              <a:t>9/27/2018</a:t>
+              <a:t>10/9/2018</a:t>
             </a:fld>
             <a:endParaRPr lang="en-US"/>
           </a:p>
@@ -4536,7 +4534,7 @@
           <a:p>
             <a:fld id="{18DCCD61-643D-44A5-A450-3A42A50CBC1E}" type="datetimeFigureOut">
               <a:rPr lang="en-US" smtClean="0"/>
-              <a:t>9/27/2018</a:t>
+              <a:t>10/9/2018</a:t>
             </a:fld>
             <a:endParaRPr lang="en-US"/>
           </a:p>
@@ -4714,7 +4712,7 @@
           <a:p>
             <a:fld id="{18DCCD61-643D-44A5-A450-3A42A50CBC1E}" type="datetimeFigureOut">
               <a:rPr lang="en-US" smtClean="0"/>
-              <a:t>9/27/2018</a:t>
+              <a:t>10/9/2018</a:t>
             </a:fld>
             <a:endParaRPr lang="en-US"/>
           </a:p>
@@ -5308,7 +5306,7 @@
           <a:p>
             <a:fld id="{18DCCD61-643D-44A5-A450-3A42A50CBC1E}" type="datetimeFigureOut">
               <a:rPr lang="en-US" smtClean="0"/>
-              <a:t>9/27/2018</a:t>
+              <a:t>10/9/2018</a:t>
             </a:fld>
             <a:endParaRPr lang="en-US"/>
           </a:p>
@@ -5476,7 +5474,7 @@
           <a:p>
             <a:fld id="{18DCCD61-643D-44A5-A450-3A42A50CBC1E}" type="datetimeFigureOut">
               <a:rPr lang="en-US" smtClean="0"/>
-              <a:t>9/27/2018</a:t>
+              <a:t>10/9/2018</a:t>
             </a:fld>
             <a:endParaRPr lang="en-US"/>
           </a:p>
@@ -5721,7 +5719,7 @@
           <a:p>
             <a:fld id="{18DCCD61-643D-44A5-A450-3A42A50CBC1E}" type="datetimeFigureOut">
               <a:rPr lang="en-US" smtClean="0"/>
-              <a:t>9/27/2018</a:t>
+              <a:t>10/9/2018</a:t>
             </a:fld>
             <a:endParaRPr lang="en-US"/>
           </a:p>
@@ -6006,7 +6004,7 @@
           <a:p>
             <a:fld id="{18DCCD61-643D-44A5-A450-3A42A50CBC1E}" type="datetimeFigureOut">
               <a:rPr lang="en-US" smtClean="0"/>
-              <a:t>9/27/2018</a:t>
+              <a:t>10/9/2018</a:t>
             </a:fld>
             <a:endParaRPr lang="en-US"/>
           </a:p>
@@ -6425,7 +6423,7 @@
           <a:p>
             <a:fld id="{18DCCD61-643D-44A5-A450-3A42A50CBC1E}" type="datetimeFigureOut">
               <a:rPr lang="en-US" smtClean="0"/>
-              <a:t>9/27/2018</a:t>
+              <a:t>10/9/2018</a:t>
             </a:fld>
             <a:endParaRPr lang="en-US"/>
           </a:p>
@@ -6542,7 +6540,7 @@
           <a:p>
             <a:fld id="{18DCCD61-643D-44A5-A450-3A42A50CBC1E}" type="datetimeFigureOut">
               <a:rPr lang="en-US" smtClean="0"/>
-              <a:t>9/27/2018</a:t>
+              <a:t>10/9/2018</a:t>
             </a:fld>
             <a:endParaRPr lang="en-US"/>
           </a:p>
@@ -7044,7 +7042,7 @@
           <a:p>
             <a:fld id="{18DCCD61-643D-44A5-A450-3A42A50CBC1E}" type="datetimeFigureOut">
               <a:rPr lang="en-US" smtClean="0"/>
-              <a:t>9/27/2018</a:t>
+              <a:t>10/9/2018</a:t>
             </a:fld>
             <a:endParaRPr lang="en-US"/>
           </a:p>
@@ -8098,7 +8096,7 @@
           <p:cNvPr id="8" name="テキスト ボックス 7">
             <a:extLst>
               <a:ext uri="{FF2B5EF4-FFF2-40B4-BE49-F238E27FC236}">
-                <a16:creationId xmlns:a16="http://schemas.microsoft.com/office/drawing/2014/main" xmlns="" id="{093C528F-2820-7842-B097-0CEA13538469}"/>
+                <a16:creationId xmlns="" xmlns:a16="http://schemas.microsoft.com/office/drawing/2014/main" id="{093C528F-2820-7842-B097-0CEA13538469}"/>
               </a:ext>
             </a:extLst>
           </p:cNvPr>
@@ -8367,21 +8365,21 @@
                 <a:gridCol w="1945230">
                   <a:extLst>
                     <a:ext uri="{9D8B030D-6E8A-4147-A177-3AD203B41FA5}">
-                      <a16:colId xmlns:a16="http://schemas.microsoft.com/office/drawing/2014/main" xmlns="" val="20000"/>
+                      <a16:colId xmlns="" xmlns:a16="http://schemas.microsoft.com/office/drawing/2014/main" val="20000"/>
                     </a:ext>
                   </a:extLst>
                 </a:gridCol>
                 <a:gridCol w="1945230">
                   <a:extLst>
                     <a:ext uri="{9D8B030D-6E8A-4147-A177-3AD203B41FA5}">
-                      <a16:colId xmlns:a16="http://schemas.microsoft.com/office/drawing/2014/main" xmlns="" val="20001"/>
+                      <a16:colId xmlns="" xmlns:a16="http://schemas.microsoft.com/office/drawing/2014/main" val="20001"/>
                     </a:ext>
                   </a:extLst>
                 </a:gridCol>
                 <a:gridCol w="1945230">
                   <a:extLst>
                     <a:ext uri="{9D8B030D-6E8A-4147-A177-3AD203B41FA5}">
-                      <a16:colId xmlns:a16="http://schemas.microsoft.com/office/drawing/2014/main" xmlns="" val="20002"/>
+                      <a16:colId xmlns="" xmlns:a16="http://schemas.microsoft.com/office/drawing/2014/main" val="20002"/>
                     </a:ext>
                   </a:extLst>
                 </a:gridCol>
@@ -8467,7 +8465,7 @@
                 </a:tc>
                 <a:extLst>
                   <a:ext uri="{0D108BD9-81ED-4DB2-BD59-A6C34878D82A}">
-                    <a16:rowId xmlns:a16="http://schemas.microsoft.com/office/drawing/2014/main" xmlns="" val="10000"/>
+                    <a16:rowId xmlns="" xmlns:a16="http://schemas.microsoft.com/office/drawing/2014/main" val="10000"/>
                   </a:ext>
                 </a:extLst>
               </a:tr>
@@ -8648,7 +8646,7 @@
                 </a:tc>
                 <a:extLst>
                   <a:ext uri="{0D108BD9-81ED-4DB2-BD59-A6C34878D82A}">
-                    <a16:rowId xmlns:a16="http://schemas.microsoft.com/office/drawing/2014/main" xmlns="" val="10001"/>
+                    <a16:rowId xmlns="" xmlns:a16="http://schemas.microsoft.com/office/drawing/2014/main" val="10001"/>
                   </a:ext>
                 </a:extLst>
               </a:tr>
@@ -8824,28 +8822,28 @@
                 <a:gridCol w="977556">
                   <a:extLst>
                     <a:ext uri="{9D8B030D-6E8A-4147-A177-3AD203B41FA5}">
-                      <a16:colId xmlns:a16="http://schemas.microsoft.com/office/drawing/2014/main" xmlns="" val="20000"/>
+                      <a16:colId xmlns="" xmlns:a16="http://schemas.microsoft.com/office/drawing/2014/main" val="20000"/>
                     </a:ext>
                   </a:extLst>
                 </a:gridCol>
                 <a:gridCol w="1944216">
                   <a:extLst>
                     <a:ext uri="{9D8B030D-6E8A-4147-A177-3AD203B41FA5}">
-                      <a16:colId xmlns:a16="http://schemas.microsoft.com/office/drawing/2014/main" xmlns="" val="20001"/>
+                      <a16:colId xmlns="" xmlns:a16="http://schemas.microsoft.com/office/drawing/2014/main" val="20001"/>
                     </a:ext>
                   </a:extLst>
                 </a:gridCol>
                 <a:gridCol w="1944216">
                   <a:extLst>
                     <a:ext uri="{9D8B030D-6E8A-4147-A177-3AD203B41FA5}">
-                      <a16:colId xmlns:a16="http://schemas.microsoft.com/office/drawing/2014/main" xmlns="" val="20002"/>
+                      <a16:colId xmlns="" xmlns:a16="http://schemas.microsoft.com/office/drawing/2014/main" val="20002"/>
                     </a:ext>
                   </a:extLst>
                 </a:gridCol>
                 <a:gridCol w="1944216">
                   <a:extLst>
                     <a:ext uri="{9D8B030D-6E8A-4147-A177-3AD203B41FA5}">
-                      <a16:colId xmlns:a16="http://schemas.microsoft.com/office/drawing/2014/main" xmlns="" val="20003"/>
+                      <a16:colId xmlns="" xmlns:a16="http://schemas.microsoft.com/office/drawing/2014/main" val="20003"/>
                     </a:ext>
                   </a:extLst>
                 </a:gridCol>
@@ -9085,7 +9083,7 @@
                 </a:tc>
                 <a:extLst>
                   <a:ext uri="{0D108BD9-81ED-4DB2-BD59-A6C34878D82A}">
-                    <a16:rowId xmlns:a16="http://schemas.microsoft.com/office/drawing/2014/main" xmlns="" val="10000"/>
+                    <a16:rowId xmlns="" xmlns:a16="http://schemas.microsoft.com/office/drawing/2014/main" val="10000"/>
                   </a:ext>
                 </a:extLst>
               </a:tr>
@@ -9240,7 +9238,7 @@
                 </a:tc>
                 <a:extLst>
                   <a:ext uri="{0D108BD9-81ED-4DB2-BD59-A6C34878D82A}">
-                    <a16:rowId xmlns:a16="http://schemas.microsoft.com/office/drawing/2014/main" xmlns="" val="10001"/>
+                    <a16:rowId xmlns="" xmlns:a16="http://schemas.microsoft.com/office/drawing/2014/main" val="10001"/>
                   </a:ext>
                 </a:extLst>
               </a:tr>
@@ -9319,7 +9317,7 @@
           <p:cNvPr id="33" name="テキスト ボックス 32">
             <a:extLst>
               <a:ext uri="{FF2B5EF4-FFF2-40B4-BE49-F238E27FC236}">
-                <a16:creationId xmlns:a16="http://schemas.microsoft.com/office/drawing/2014/main" xmlns="" id="{093C528F-2820-7842-B097-0CEA13538469}"/>
+                <a16:creationId xmlns="" xmlns:a16="http://schemas.microsoft.com/office/drawing/2014/main" id="{093C528F-2820-7842-B097-0CEA13538469}"/>
               </a:ext>
             </a:extLst>
           </p:cNvPr>
@@ -9388,42 +9386,42 @@
                 <a:gridCol w="681899">
                   <a:extLst>
                     <a:ext uri="{9D8B030D-6E8A-4147-A177-3AD203B41FA5}">
-                      <a16:colId xmlns:a16="http://schemas.microsoft.com/office/drawing/2014/main" xmlns="" val="20000"/>
+                      <a16:colId xmlns="" xmlns:a16="http://schemas.microsoft.com/office/drawing/2014/main" val="20000"/>
                     </a:ext>
                   </a:extLst>
                 </a:gridCol>
                 <a:gridCol w="254206">
                   <a:extLst>
                     <a:ext uri="{9D8B030D-6E8A-4147-A177-3AD203B41FA5}">
-                      <a16:colId xmlns:a16="http://schemas.microsoft.com/office/drawing/2014/main" xmlns="" val="20001"/>
+                      <a16:colId xmlns="" xmlns:a16="http://schemas.microsoft.com/office/drawing/2014/main" val="20001"/>
                     </a:ext>
                   </a:extLst>
                 </a:gridCol>
                 <a:gridCol w="1008112">
                   <a:extLst>
                     <a:ext uri="{9D8B030D-6E8A-4147-A177-3AD203B41FA5}">
-                      <a16:colId xmlns:a16="http://schemas.microsoft.com/office/drawing/2014/main" xmlns="" val="20002"/>
+                      <a16:colId xmlns="" xmlns:a16="http://schemas.microsoft.com/office/drawing/2014/main" val="20002"/>
                     </a:ext>
                   </a:extLst>
                 </a:gridCol>
                 <a:gridCol w="1944216">
                   <a:extLst>
                     <a:ext uri="{9D8B030D-6E8A-4147-A177-3AD203B41FA5}">
-                      <a16:colId xmlns:a16="http://schemas.microsoft.com/office/drawing/2014/main" xmlns="" val="20003"/>
+                      <a16:colId xmlns="" xmlns:a16="http://schemas.microsoft.com/office/drawing/2014/main" val="20003"/>
                     </a:ext>
                   </a:extLst>
                 </a:gridCol>
                 <a:gridCol w="1944216">
                   <a:extLst>
                     <a:ext uri="{9D8B030D-6E8A-4147-A177-3AD203B41FA5}">
-                      <a16:colId xmlns:a16="http://schemas.microsoft.com/office/drawing/2014/main" xmlns="" val="20004"/>
+                      <a16:colId xmlns="" xmlns:a16="http://schemas.microsoft.com/office/drawing/2014/main" val="20004"/>
                     </a:ext>
                   </a:extLst>
                 </a:gridCol>
                 <a:gridCol w="1935073">
                   <a:extLst>
                     <a:ext uri="{9D8B030D-6E8A-4147-A177-3AD203B41FA5}">
-                      <a16:colId xmlns:a16="http://schemas.microsoft.com/office/drawing/2014/main" xmlns="" val="20005"/>
+                      <a16:colId xmlns="" xmlns:a16="http://schemas.microsoft.com/office/drawing/2014/main" val="20005"/>
                     </a:ext>
                   </a:extLst>
                 </a:gridCol>
@@ -9782,7 +9780,7 @@
                 </a:tc>
                 <a:extLst>
                   <a:ext uri="{0D108BD9-81ED-4DB2-BD59-A6C34878D82A}">
-                    <a16:rowId xmlns:a16="http://schemas.microsoft.com/office/drawing/2014/main" xmlns="" val="10000"/>
+                    <a16:rowId xmlns="" xmlns:a16="http://schemas.microsoft.com/office/drawing/2014/main" val="10000"/>
                   </a:ext>
                 </a:extLst>
               </a:tr>
@@ -10092,7 +10090,7 @@
                 </a:tc>
                 <a:extLst>
                   <a:ext uri="{0D108BD9-81ED-4DB2-BD59-A6C34878D82A}">
-                    <a16:rowId xmlns:a16="http://schemas.microsoft.com/office/drawing/2014/main" xmlns="" val="10001"/>
+                    <a16:rowId xmlns="" xmlns:a16="http://schemas.microsoft.com/office/drawing/2014/main" val="10001"/>
                   </a:ext>
                 </a:extLst>
               </a:tr>
@@ -10402,7 +10400,7 @@
                 </a:tc>
                 <a:extLst>
                   <a:ext uri="{0D108BD9-81ED-4DB2-BD59-A6C34878D82A}">
-                    <a16:rowId xmlns:a16="http://schemas.microsoft.com/office/drawing/2014/main" xmlns="" val="10002"/>
+                    <a16:rowId xmlns="" xmlns:a16="http://schemas.microsoft.com/office/drawing/2014/main" val="10002"/>
                   </a:ext>
                 </a:extLst>
               </a:tr>
@@ -10712,7 +10710,7 @@
                 </a:tc>
                 <a:extLst>
                   <a:ext uri="{0D108BD9-81ED-4DB2-BD59-A6C34878D82A}">
-                    <a16:rowId xmlns:a16="http://schemas.microsoft.com/office/drawing/2014/main" xmlns="" val="10003"/>
+                    <a16:rowId xmlns="" xmlns:a16="http://schemas.microsoft.com/office/drawing/2014/main" val="10003"/>
                   </a:ext>
                 </a:extLst>
               </a:tr>
@@ -11022,7 +11020,7 @@
                 </a:tc>
                 <a:extLst>
                   <a:ext uri="{0D108BD9-81ED-4DB2-BD59-A6C34878D82A}">
-                    <a16:rowId xmlns:a16="http://schemas.microsoft.com/office/drawing/2014/main" xmlns="" val="10004"/>
+                    <a16:rowId xmlns="" xmlns:a16="http://schemas.microsoft.com/office/drawing/2014/main" val="10004"/>
                   </a:ext>
                 </a:extLst>
               </a:tr>
@@ -11134,7 +11132,7 @@
           <p:cNvPr id="8" name="テキスト ボックス 7">
             <a:extLst>
               <a:ext uri="{FF2B5EF4-FFF2-40B4-BE49-F238E27FC236}">
-                <a16:creationId xmlns:a16="http://schemas.microsoft.com/office/drawing/2014/main" xmlns="" id="{093C528F-2820-7842-B097-0CEA13538469}"/>
+                <a16:creationId xmlns="" xmlns:a16="http://schemas.microsoft.com/office/drawing/2014/main" id="{093C528F-2820-7842-B097-0CEA13538469}"/>
               </a:ext>
             </a:extLst>
           </p:cNvPr>
@@ -11174,7 +11172,7 @@
           <p:cNvPr id="3" name="グラフ 2">
             <a:extLst>
               <a:ext uri="{FF2B5EF4-FFF2-40B4-BE49-F238E27FC236}">
-                <a16:creationId xmlns:a16="http://schemas.microsoft.com/office/drawing/2014/main" xmlns="" id="{CE328C13-7CB1-DB4C-9E12-49119544EAA9}"/>
+                <a16:creationId xmlns="" xmlns:a16="http://schemas.microsoft.com/office/drawing/2014/main" id="{CE328C13-7CB1-DB4C-9E12-49119544EAA9}"/>
               </a:ext>
             </a:extLst>
           </p:cNvPr>
@@ -11695,21 +11693,21 @@
                 <a:gridCol w="1945230">
                   <a:extLst>
                     <a:ext uri="{9D8B030D-6E8A-4147-A177-3AD203B41FA5}">
-                      <a16:colId xmlns:a16="http://schemas.microsoft.com/office/drawing/2014/main" xmlns="" val="20000"/>
+                      <a16:colId xmlns="" xmlns:a16="http://schemas.microsoft.com/office/drawing/2014/main" val="20000"/>
                     </a:ext>
                   </a:extLst>
                 </a:gridCol>
                 <a:gridCol w="1945230">
                   <a:extLst>
                     <a:ext uri="{9D8B030D-6E8A-4147-A177-3AD203B41FA5}">
-                      <a16:colId xmlns:a16="http://schemas.microsoft.com/office/drawing/2014/main" xmlns="" val="20001"/>
+                      <a16:colId xmlns="" xmlns:a16="http://schemas.microsoft.com/office/drawing/2014/main" val="20001"/>
                     </a:ext>
                   </a:extLst>
                 </a:gridCol>
                 <a:gridCol w="1945230">
                   <a:extLst>
                     <a:ext uri="{9D8B030D-6E8A-4147-A177-3AD203B41FA5}">
-                      <a16:colId xmlns:a16="http://schemas.microsoft.com/office/drawing/2014/main" xmlns="" val="20002"/>
+                      <a16:colId xmlns="" xmlns:a16="http://schemas.microsoft.com/office/drawing/2014/main" val="20002"/>
                     </a:ext>
                   </a:extLst>
                 </a:gridCol>
@@ -11795,7 +11793,7 @@
                 </a:tc>
                 <a:extLst>
                   <a:ext uri="{0D108BD9-81ED-4DB2-BD59-A6C34878D82A}">
-                    <a16:rowId xmlns:a16="http://schemas.microsoft.com/office/drawing/2014/main" xmlns="" val="10000"/>
+                    <a16:rowId xmlns="" xmlns:a16="http://schemas.microsoft.com/office/drawing/2014/main" val="10000"/>
                   </a:ext>
                 </a:extLst>
               </a:tr>
@@ -11976,7 +11974,7 @@
                 </a:tc>
                 <a:extLst>
                   <a:ext uri="{0D108BD9-81ED-4DB2-BD59-A6C34878D82A}">
-                    <a16:rowId xmlns:a16="http://schemas.microsoft.com/office/drawing/2014/main" xmlns="" val="10001"/>
+                    <a16:rowId xmlns="" xmlns:a16="http://schemas.microsoft.com/office/drawing/2014/main" val="10001"/>
                   </a:ext>
                 </a:extLst>
               </a:tr>
@@ -12218,42 +12216,42 @@
                 <a:gridCol w="681899">
                   <a:extLst>
                     <a:ext uri="{9D8B030D-6E8A-4147-A177-3AD203B41FA5}">
-                      <a16:colId xmlns:a16="http://schemas.microsoft.com/office/drawing/2014/main" xmlns="" val="20000"/>
+                      <a16:colId xmlns="" xmlns:a16="http://schemas.microsoft.com/office/drawing/2014/main" val="20000"/>
                     </a:ext>
                   </a:extLst>
                 </a:gridCol>
                 <a:gridCol w="254206">
                   <a:extLst>
                     <a:ext uri="{9D8B030D-6E8A-4147-A177-3AD203B41FA5}">
-                      <a16:colId xmlns:a16="http://schemas.microsoft.com/office/drawing/2014/main" xmlns="" val="20001"/>
+                      <a16:colId xmlns="" xmlns:a16="http://schemas.microsoft.com/office/drawing/2014/main" val="20001"/>
                     </a:ext>
                   </a:extLst>
                 </a:gridCol>
                 <a:gridCol w="1008112">
                   <a:extLst>
                     <a:ext uri="{9D8B030D-6E8A-4147-A177-3AD203B41FA5}">
-                      <a16:colId xmlns:a16="http://schemas.microsoft.com/office/drawing/2014/main" xmlns="" val="20002"/>
+                      <a16:colId xmlns="" xmlns:a16="http://schemas.microsoft.com/office/drawing/2014/main" val="20002"/>
                     </a:ext>
                   </a:extLst>
                 </a:gridCol>
                 <a:gridCol w="1944216">
                   <a:extLst>
                     <a:ext uri="{9D8B030D-6E8A-4147-A177-3AD203B41FA5}">
-                      <a16:colId xmlns:a16="http://schemas.microsoft.com/office/drawing/2014/main" xmlns="" val="20003"/>
+                      <a16:colId xmlns="" xmlns:a16="http://schemas.microsoft.com/office/drawing/2014/main" val="20003"/>
                     </a:ext>
                   </a:extLst>
                 </a:gridCol>
                 <a:gridCol w="1944216">
                   <a:extLst>
                     <a:ext uri="{9D8B030D-6E8A-4147-A177-3AD203B41FA5}">
-                      <a16:colId xmlns:a16="http://schemas.microsoft.com/office/drawing/2014/main" xmlns="" val="20004"/>
+                      <a16:colId xmlns="" xmlns:a16="http://schemas.microsoft.com/office/drawing/2014/main" val="20004"/>
                     </a:ext>
                   </a:extLst>
                 </a:gridCol>
                 <a:gridCol w="1935073">
                   <a:extLst>
                     <a:ext uri="{9D8B030D-6E8A-4147-A177-3AD203B41FA5}">
-                      <a16:colId xmlns:a16="http://schemas.microsoft.com/office/drawing/2014/main" xmlns="" val="20005"/>
+                      <a16:colId xmlns="" xmlns:a16="http://schemas.microsoft.com/office/drawing/2014/main" val="20005"/>
                     </a:ext>
                   </a:extLst>
                 </a:gridCol>
@@ -12612,7 +12610,7 @@
                 </a:tc>
                 <a:extLst>
                   <a:ext uri="{0D108BD9-81ED-4DB2-BD59-A6C34878D82A}">
-                    <a16:rowId xmlns:a16="http://schemas.microsoft.com/office/drawing/2014/main" xmlns="" val="10000"/>
+                    <a16:rowId xmlns="" xmlns:a16="http://schemas.microsoft.com/office/drawing/2014/main" val="10000"/>
                   </a:ext>
                 </a:extLst>
               </a:tr>
@@ -12922,7 +12920,7 @@
                 </a:tc>
                 <a:extLst>
                   <a:ext uri="{0D108BD9-81ED-4DB2-BD59-A6C34878D82A}">
-                    <a16:rowId xmlns:a16="http://schemas.microsoft.com/office/drawing/2014/main" xmlns="" val="10001"/>
+                    <a16:rowId xmlns="" xmlns:a16="http://schemas.microsoft.com/office/drawing/2014/main" val="10001"/>
                   </a:ext>
                 </a:extLst>
               </a:tr>
@@ -13232,7 +13230,7 @@
                 </a:tc>
                 <a:extLst>
                   <a:ext uri="{0D108BD9-81ED-4DB2-BD59-A6C34878D82A}">
-                    <a16:rowId xmlns:a16="http://schemas.microsoft.com/office/drawing/2014/main" xmlns="" val="10002"/>
+                    <a16:rowId xmlns="" xmlns:a16="http://schemas.microsoft.com/office/drawing/2014/main" val="10002"/>
                   </a:ext>
                 </a:extLst>
               </a:tr>
@@ -13542,7 +13540,7 @@
                 </a:tc>
                 <a:extLst>
                   <a:ext uri="{0D108BD9-81ED-4DB2-BD59-A6C34878D82A}">
-                    <a16:rowId xmlns:a16="http://schemas.microsoft.com/office/drawing/2014/main" xmlns="" val="10003"/>
+                    <a16:rowId xmlns="" xmlns:a16="http://schemas.microsoft.com/office/drawing/2014/main" val="10003"/>
                   </a:ext>
                 </a:extLst>
               </a:tr>
@@ -13852,7 +13850,7 @@
                 </a:tc>
                 <a:extLst>
                   <a:ext uri="{0D108BD9-81ED-4DB2-BD59-A6C34878D82A}">
-                    <a16:rowId xmlns:a16="http://schemas.microsoft.com/office/drawing/2014/main" xmlns="" val="10004"/>
+                    <a16:rowId xmlns="" xmlns:a16="http://schemas.microsoft.com/office/drawing/2014/main" val="10004"/>
                   </a:ext>
                 </a:extLst>
               </a:tr>
@@ -13865,7 +13863,7 @@
           <p:cNvPr id="20" name="テキスト ボックス 19">
             <a:extLst>
               <a:ext uri="{FF2B5EF4-FFF2-40B4-BE49-F238E27FC236}">
-                <a16:creationId xmlns:a16="http://schemas.microsoft.com/office/drawing/2014/main" xmlns="" id="{093C528F-2820-7842-B097-0CEA13538469}"/>
+                <a16:creationId xmlns="" xmlns:a16="http://schemas.microsoft.com/office/drawing/2014/main" id="{093C528F-2820-7842-B097-0CEA13538469}"/>
               </a:ext>
             </a:extLst>
           </p:cNvPr>
@@ -13895,11 +13893,7 @@
             </a:r>
             <a:r>
               <a:rPr kumimoji="1" lang="en-US" altLang="ja-JP" u="sng" dirty="0" smtClean="0"/>
-              <a:t>ate</a:t>
-            </a:r>
-            <a:r>
-              <a:rPr kumimoji="1" lang="en-US" altLang="ja-JP" u="sng" dirty="0" smtClean="0"/>
-              <a:t> </a:t>
+              <a:t>ate </a:t>
             </a:r>
             <a:r>
               <a:rPr kumimoji="1" lang="en-US" altLang="ja-JP" u="sng" dirty="0"/>
@@ -14503,7 +14497,7 @@
           <p:cNvPr id="5" name="正方形/長方形 4">
             <a:extLst>
               <a:ext uri="{FF2B5EF4-FFF2-40B4-BE49-F238E27FC236}">
-                <a16:creationId xmlns:a16="http://schemas.microsoft.com/office/drawing/2014/main" xmlns="" id="{24BDBAAB-565F-544E-8F79-2E06B1AC400F}"/>
+                <a16:creationId xmlns="" xmlns:a16="http://schemas.microsoft.com/office/drawing/2014/main" id="{24BDBAAB-565F-544E-8F79-2E06B1AC400F}"/>
               </a:ext>
             </a:extLst>
           </p:cNvPr>
@@ -14557,7 +14551,7 @@
           <p:cNvPr id="3" name="コンテンツ プレースホルダー 2">
             <a:extLst>
               <a:ext uri="{FF2B5EF4-FFF2-40B4-BE49-F238E27FC236}">
-                <a16:creationId xmlns:a16="http://schemas.microsoft.com/office/drawing/2014/main" xmlns="" id="{57201CEF-5B54-EC41-97DF-2A5FDA9A8199}"/>
+                <a16:creationId xmlns="" xmlns:a16="http://schemas.microsoft.com/office/drawing/2014/main" id="{57201CEF-5B54-EC41-97DF-2A5FDA9A8199}"/>
               </a:ext>
             </a:extLst>
           </p:cNvPr>
@@ -14715,28 +14709,28 @@
                 <a:gridCol w="1980220">
                   <a:extLst>
                     <a:ext uri="{9D8B030D-6E8A-4147-A177-3AD203B41FA5}">
-                      <a16:colId xmlns:a16="http://schemas.microsoft.com/office/drawing/2014/main" xmlns="" val="20000"/>
+                      <a16:colId xmlns="" xmlns:a16="http://schemas.microsoft.com/office/drawing/2014/main" val="20000"/>
                     </a:ext>
                   </a:extLst>
                 </a:gridCol>
                 <a:gridCol w="1980220">
                   <a:extLst>
                     <a:ext uri="{9D8B030D-6E8A-4147-A177-3AD203B41FA5}">
-                      <a16:colId xmlns:a16="http://schemas.microsoft.com/office/drawing/2014/main" xmlns="" val="20001"/>
+                      <a16:colId xmlns="" xmlns:a16="http://schemas.microsoft.com/office/drawing/2014/main" val="20001"/>
                     </a:ext>
                   </a:extLst>
                 </a:gridCol>
                 <a:gridCol w="1980220">
                   <a:extLst>
                     <a:ext uri="{9D8B030D-6E8A-4147-A177-3AD203B41FA5}">
-                      <a16:colId xmlns:a16="http://schemas.microsoft.com/office/drawing/2014/main" xmlns="" val="20002"/>
+                      <a16:colId xmlns="" xmlns:a16="http://schemas.microsoft.com/office/drawing/2014/main" val="20002"/>
                     </a:ext>
                   </a:extLst>
                 </a:gridCol>
                 <a:gridCol w="1980220">
                   <a:extLst>
                     <a:ext uri="{9D8B030D-6E8A-4147-A177-3AD203B41FA5}">
-                      <a16:colId xmlns:a16="http://schemas.microsoft.com/office/drawing/2014/main" xmlns="" val="20003"/>
+                      <a16:colId xmlns="" xmlns:a16="http://schemas.microsoft.com/office/drawing/2014/main" val="20003"/>
                     </a:ext>
                   </a:extLst>
                 </a:gridCol>
@@ -14853,7 +14847,7 @@
                 </a:tc>
                 <a:extLst>
                   <a:ext uri="{0D108BD9-81ED-4DB2-BD59-A6C34878D82A}">
-                    <a16:rowId xmlns:a16="http://schemas.microsoft.com/office/drawing/2014/main" xmlns="" val="10000"/>
+                    <a16:rowId xmlns="" xmlns:a16="http://schemas.microsoft.com/office/drawing/2014/main" val="10000"/>
                   </a:ext>
                 </a:extLst>
               </a:tr>
@@ -15015,7 +15009,7 @@
                 </a:tc>
                 <a:extLst>
                   <a:ext uri="{0D108BD9-81ED-4DB2-BD59-A6C34878D82A}">
-                    <a16:rowId xmlns:a16="http://schemas.microsoft.com/office/drawing/2014/main" xmlns="" val="10001"/>
+                    <a16:rowId xmlns="" xmlns:a16="http://schemas.microsoft.com/office/drawing/2014/main" val="10001"/>
                   </a:ext>
                 </a:extLst>
               </a:tr>
@@ -15058,7 +15052,7 @@
           <p:cNvPr id="5" name="正方形/長方形 4">
             <a:extLst>
               <a:ext uri="{FF2B5EF4-FFF2-40B4-BE49-F238E27FC236}">
-                <a16:creationId xmlns:a16="http://schemas.microsoft.com/office/drawing/2014/main" xmlns="" id="{24BDBAAB-565F-544E-8F79-2E06B1AC400F}"/>
+                <a16:creationId xmlns="" xmlns:a16="http://schemas.microsoft.com/office/drawing/2014/main" id="{24BDBAAB-565F-544E-8F79-2E06B1AC400F}"/>
               </a:ext>
             </a:extLst>
           </p:cNvPr>
@@ -15112,7 +15106,7 @@
           <p:cNvPr id="3" name="コンテンツ プレースホルダー 2">
             <a:extLst>
               <a:ext uri="{FF2B5EF4-FFF2-40B4-BE49-F238E27FC236}">
-                <a16:creationId xmlns:a16="http://schemas.microsoft.com/office/drawing/2014/main" xmlns="" id="{57201CEF-5B54-EC41-97DF-2A5FDA9A8199}"/>
+                <a16:creationId xmlns="" xmlns:a16="http://schemas.microsoft.com/office/drawing/2014/main" id="{57201CEF-5B54-EC41-97DF-2A5FDA9A8199}"/>
               </a:ext>
             </a:extLst>
           </p:cNvPr>
@@ -15363,7 +15357,7 @@
           <p:cNvPr id="8" name="テキスト ボックス 7">
             <a:extLst>
               <a:ext uri="{FF2B5EF4-FFF2-40B4-BE49-F238E27FC236}">
-                <a16:creationId xmlns:a16="http://schemas.microsoft.com/office/drawing/2014/main" xmlns="" id="{093C528F-2820-7842-B097-0CEA13538469}"/>
+                <a16:creationId xmlns="" xmlns:a16="http://schemas.microsoft.com/office/drawing/2014/main" id="{093C528F-2820-7842-B097-0CEA13538469}"/>
               </a:ext>
             </a:extLst>
           </p:cNvPr>
@@ -15614,7 +15608,7 @@
           <p:cNvPr id="8" name="テキスト ボックス 7">
             <a:extLst>
               <a:ext uri="{FF2B5EF4-FFF2-40B4-BE49-F238E27FC236}">
-                <a16:creationId xmlns:a16="http://schemas.microsoft.com/office/drawing/2014/main" xmlns="" id="{093C528F-2820-7842-B097-0CEA13538469}"/>
+                <a16:creationId xmlns="" xmlns:a16="http://schemas.microsoft.com/office/drawing/2014/main" id="{093C528F-2820-7842-B097-0CEA13538469}"/>
               </a:ext>
             </a:extLst>
           </p:cNvPr>
@@ -15978,7 +15972,7 @@
           <p:cNvPr id="8" name="テキスト ボックス 7">
             <a:extLst>
               <a:ext uri="{FF2B5EF4-FFF2-40B4-BE49-F238E27FC236}">
-                <a16:creationId xmlns:a16="http://schemas.microsoft.com/office/drawing/2014/main" xmlns="" id="{093C528F-2820-7842-B097-0CEA13538469}"/>
+                <a16:creationId xmlns="" xmlns:a16="http://schemas.microsoft.com/office/drawing/2014/main" id="{093C528F-2820-7842-B097-0CEA13538469}"/>
               </a:ext>
             </a:extLst>
           </p:cNvPr>
@@ -16303,28 +16297,28 @@
                 <a:gridCol w="977556">
                   <a:extLst>
                     <a:ext uri="{9D8B030D-6E8A-4147-A177-3AD203B41FA5}">
-                      <a16:colId xmlns:a16="http://schemas.microsoft.com/office/drawing/2014/main" xmlns="" val="20000"/>
+                      <a16:colId xmlns="" xmlns:a16="http://schemas.microsoft.com/office/drawing/2014/main" val="20000"/>
                     </a:ext>
                   </a:extLst>
                 </a:gridCol>
                 <a:gridCol w="1944216">
                   <a:extLst>
                     <a:ext uri="{9D8B030D-6E8A-4147-A177-3AD203B41FA5}">
-                      <a16:colId xmlns:a16="http://schemas.microsoft.com/office/drawing/2014/main" xmlns="" val="20001"/>
+                      <a16:colId xmlns="" xmlns:a16="http://schemas.microsoft.com/office/drawing/2014/main" val="20001"/>
                     </a:ext>
                   </a:extLst>
                 </a:gridCol>
                 <a:gridCol w="1944216">
                   <a:extLst>
                     <a:ext uri="{9D8B030D-6E8A-4147-A177-3AD203B41FA5}">
-                      <a16:colId xmlns:a16="http://schemas.microsoft.com/office/drawing/2014/main" xmlns="" val="20002"/>
+                      <a16:colId xmlns="" xmlns:a16="http://schemas.microsoft.com/office/drawing/2014/main" val="20002"/>
                     </a:ext>
                   </a:extLst>
                 </a:gridCol>
                 <a:gridCol w="1944216">
                   <a:extLst>
                     <a:ext uri="{9D8B030D-6E8A-4147-A177-3AD203B41FA5}">
-                      <a16:colId xmlns:a16="http://schemas.microsoft.com/office/drawing/2014/main" xmlns="" val="20003"/>
+                      <a16:colId xmlns="" xmlns:a16="http://schemas.microsoft.com/office/drawing/2014/main" val="20003"/>
                     </a:ext>
                   </a:extLst>
                 </a:gridCol>
@@ -16564,7 +16558,7 @@
                 </a:tc>
                 <a:extLst>
                   <a:ext uri="{0D108BD9-81ED-4DB2-BD59-A6C34878D82A}">
-                    <a16:rowId xmlns:a16="http://schemas.microsoft.com/office/drawing/2014/main" xmlns="" val="10000"/>
+                    <a16:rowId xmlns="" xmlns:a16="http://schemas.microsoft.com/office/drawing/2014/main" val="10000"/>
                   </a:ext>
                 </a:extLst>
               </a:tr>
@@ -16719,7 +16713,7 @@
                 </a:tc>
                 <a:extLst>
                   <a:ext uri="{0D108BD9-81ED-4DB2-BD59-A6C34878D82A}">
-                    <a16:rowId xmlns:a16="http://schemas.microsoft.com/office/drawing/2014/main" xmlns="" val="10001"/>
+                    <a16:rowId xmlns="" xmlns:a16="http://schemas.microsoft.com/office/drawing/2014/main" val="10001"/>
                   </a:ext>
                 </a:extLst>
               </a:tr>
@@ -16798,7 +16792,7 @@
           <p:cNvPr id="33" name="テキスト ボックス 32">
             <a:extLst>
               <a:ext uri="{FF2B5EF4-FFF2-40B4-BE49-F238E27FC236}">
-                <a16:creationId xmlns:a16="http://schemas.microsoft.com/office/drawing/2014/main" xmlns="" id="{093C528F-2820-7842-B097-0CEA13538469}"/>
+                <a16:creationId xmlns="" xmlns:a16="http://schemas.microsoft.com/office/drawing/2014/main" id="{093C528F-2820-7842-B097-0CEA13538469}"/>
               </a:ext>
             </a:extLst>
           </p:cNvPr>
@@ -16867,42 +16861,42 @@
                 <a:gridCol w="681899">
                   <a:extLst>
                     <a:ext uri="{9D8B030D-6E8A-4147-A177-3AD203B41FA5}">
-                      <a16:colId xmlns:a16="http://schemas.microsoft.com/office/drawing/2014/main" xmlns="" val="20000"/>
+                      <a16:colId xmlns="" xmlns:a16="http://schemas.microsoft.com/office/drawing/2014/main" val="20000"/>
                     </a:ext>
                   </a:extLst>
                 </a:gridCol>
                 <a:gridCol w="254206">
                   <a:extLst>
                     <a:ext uri="{9D8B030D-6E8A-4147-A177-3AD203B41FA5}">
-                      <a16:colId xmlns:a16="http://schemas.microsoft.com/office/drawing/2014/main" xmlns="" val="20001"/>
+                      <a16:colId xmlns="" xmlns:a16="http://schemas.microsoft.com/office/drawing/2014/main" val="20001"/>
                     </a:ext>
                   </a:extLst>
                 </a:gridCol>
                 <a:gridCol w="1008112">
                   <a:extLst>
                     <a:ext uri="{9D8B030D-6E8A-4147-A177-3AD203B41FA5}">
-                      <a16:colId xmlns:a16="http://schemas.microsoft.com/office/drawing/2014/main" xmlns="" val="20002"/>
+                      <a16:colId xmlns="" xmlns:a16="http://schemas.microsoft.com/office/drawing/2014/main" val="20002"/>
                     </a:ext>
                   </a:extLst>
                 </a:gridCol>
                 <a:gridCol w="1944216">
                   <a:extLst>
                     <a:ext uri="{9D8B030D-6E8A-4147-A177-3AD203B41FA5}">
-                      <a16:colId xmlns:a16="http://schemas.microsoft.com/office/drawing/2014/main" xmlns="" val="20003"/>
+                      <a16:colId xmlns="" xmlns:a16="http://schemas.microsoft.com/office/drawing/2014/main" val="20003"/>
                     </a:ext>
                   </a:extLst>
                 </a:gridCol>
                 <a:gridCol w="1944216">
                   <a:extLst>
                     <a:ext uri="{9D8B030D-6E8A-4147-A177-3AD203B41FA5}">
-                      <a16:colId xmlns:a16="http://schemas.microsoft.com/office/drawing/2014/main" xmlns="" val="20004"/>
+                      <a16:colId xmlns="" xmlns:a16="http://schemas.microsoft.com/office/drawing/2014/main" val="20004"/>
                     </a:ext>
                   </a:extLst>
                 </a:gridCol>
                 <a:gridCol w="1935073">
                   <a:extLst>
                     <a:ext uri="{9D8B030D-6E8A-4147-A177-3AD203B41FA5}">
-                      <a16:colId xmlns:a16="http://schemas.microsoft.com/office/drawing/2014/main" xmlns="" val="20005"/>
+                      <a16:colId xmlns="" xmlns:a16="http://schemas.microsoft.com/office/drawing/2014/main" val="20005"/>
                     </a:ext>
                   </a:extLst>
                 </a:gridCol>
@@ -17261,7 +17255,7 @@
                 </a:tc>
                 <a:extLst>
                   <a:ext uri="{0D108BD9-81ED-4DB2-BD59-A6C34878D82A}">
-                    <a16:rowId xmlns:a16="http://schemas.microsoft.com/office/drawing/2014/main" xmlns="" val="10000"/>
+                    <a16:rowId xmlns="" xmlns:a16="http://schemas.microsoft.com/office/drawing/2014/main" val="10000"/>
                   </a:ext>
                 </a:extLst>
               </a:tr>
@@ -17571,7 +17565,7 @@
                 </a:tc>
                 <a:extLst>
                   <a:ext uri="{0D108BD9-81ED-4DB2-BD59-A6C34878D82A}">
-                    <a16:rowId xmlns:a16="http://schemas.microsoft.com/office/drawing/2014/main" xmlns="" val="10001"/>
+                    <a16:rowId xmlns="" xmlns:a16="http://schemas.microsoft.com/office/drawing/2014/main" val="10001"/>
                   </a:ext>
                 </a:extLst>
               </a:tr>
@@ -17881,7 +17875,7 @@
                 </a:tc>
                 <a:extLst>
                   <a:ext uri="{0D108BD9-81ED-4DB2-BD59-A6C34878D82A}">
-                    <a16:rowId xmlns:a16="http://schemas.microsoft.com/office/drawing/2014/main" xmlns="" val="10002"/>
+                    <a16:rowId xmlns="" xmlns:a16="http://schemas.microsoft.com/office/drawing/2014/main" val="10002"/>
                   </a:ext>
                 </a:extLst>
               </a:tr>
@@ -18191,7 +18185,7 @@
                 </a:tc>
                 <a:extLst>
                   <a:ext uri="{0D108BD9-81ED-4DB2-BD59-A6C34878D82A}">
-                    <a16:rowId xmlns:a16="http://schemas.microsoft.com/office/drawing/2014/main" xmlns="" val="10003"/>
+                    <a16:rowId xmlns="" xmlns:a16="http://schemas.microsoft.com/office/drawing/2014/main" val="10003"/>
                   </a:ext>
                 </a:extLst>
               </a:tr>
@@ -18501,7 +18495,7 @@
                 </a:tc>
                 <a:extLst>
                   <a:ext uri="{0D108BD9-81ED-4DB2-BD59-A6C34878D82A}">
-                    <a16:rowId xmlns:a16="http://schemas.microsoft.com/office/drawing/2014/main" xmlns="" val="10004"/>
+                    <a16:rowId xmlns="" xmlns:a16="http://schemas.microsoft.com/office/drawing/2014/main" val="10004"/>
                   </a:ext>
                 </a:extLst>
               </a:tr>
@@ -18535,21 +18529,21 @@
                 <a:gridCol w="1945280">
                   <a:extLst>
                     <a:ext uri="{9D8B030D-6E8A-4147-A177-3AD203B41FA5}">
-                      <a16:colId xmlns:a16="http://schemas.microsoft.com/office/drawing/2014/main" xmlns="" val="20000"/>
+                      <a16:colId xmlns="" xmlns:a16="http://schemas.microsoft.com/office/drawing/2014/main" val="20000"/>
                     </a:ext>
                   </a:extLst>
                 </a:gridCol>
                 <a:gridCol w="1945280">
                   <a:extLst>
                     <a:ext uri="{9D8B030D-6E8A-4147-A177-3AD203B41FA5}">
-                      <a16:colId xmlns:a16="http://schemas.microsoft.com/office/drawing/2014/main" xmlns="" val="20001"/>
+                      <a16:colId xmlns="" xmlns:a16="http://schemas.microsoft.com/office/drawing/2014/main" val="20001"/>
                     </a:ext>
                   </a:extLst>
                 </a:gridCol>
                 <a:gridCol w="1945280">
                   <a:extLst>
                     <a:ext uri="{9D8B030D-6E8A-4147-A177-3AD203B41FA5}">
-                      <a16:colId xmlns:a16="http://schemas.microsoft.com/office/drawing/2014/main" xmlns="" val="20002"/>
+                      <a16:colId xmlns="" xmlns:a16="http://schemas.microsoft.com/office/drawing/2014/main" val="20002"/>
                     </a:ext>
                   </a:extLst>
                 </a:gridCol>
@@ -18635,7 +18629,7 @@
                 </a:tc>
                 <a:extLst>
                   <a:ext uri="{0D108BD9-81ED-4DB2-BD59-A6C34878D82A}">
-                    <a16:rowId xmlns:a16="http://schemas.microsoft.com/office/drawing/2014/main" xmlns="" val="10000"/>
+                    <a16:rowId xmlns="" xmlns:a16="http://schemas.microsoft.com/office/drawing/2014/main" val="10000"/>
                   </a:ext>
                 </a:extLst>
               </a:tr>
@@ -18860,7 +18854,7 @@
                 </a:tc>
                 <a:extLst>
                   <a:ext uri="{0D108BD9-81ED-4DB2-BD59-A6C34878D82A}">
-                    <a16:rowId xmlns:a16="http://schemas.microsoft.com/office/drawing/2014/main" xmlns="" val="10001"/>
+                    <a16:rowId xmlns="" xmlns:a16="http://schemas.microsoft.com/office/drawing/2014/main" val="10001"/>
                   </a:ext>
                 </a:extLst>
               </a:tr>
@@ -19295,42 +19289,42 @@
                 <a:gridCol w="681899">
                   <a:extLst>
                     <a:ext uri="{9D8B030D-6E8A-4147-A177-3AD203B41FA5}">
-                      <a16:colId xmlns:a16="http://schemas.microsoft.com/office/drawing/2014/main" xmlns="" val="20000"/>
+                      <a16:colId xmlns="" xmlns:a16="http://schemas.microsoft.com/office/drawing/2014/main" val="20000"/>
                     </a:ext>
                   </a:extLst>
                 </a:gridCol>
                 <a:gridCol w="254206">
                   <a:extLst>
                     <a:ext uri="{9D8B030D-6E8A-4147-A177-3AD203B41FA5}">
-                      <a16:colId xmlns:a16="http://schemas.microsoft.com/office/drawing/2014/main" xmlns="" val="20001"/>
+                      <a16:colId xmlns="" xmlns:a16="http://schemas.microsoft.com/office/drawing/2014/main" val="20001"/>
                     </a:ext>
                   </a:extLst>
                 </a:gridCol>
                 <a:gridCol w="1008112">
                   <a:extLst>
                     <a:ext uri="{9D8B030D-6E8A-4147-A177-3AD203B41FA5}">
-                      <a16:colId xmlns:a16="http://schemas.microsoft.com/office/drawing/2014/main" xmlns="" val="20002"/>
+                      <a16:colId xmlns="" xmlns:a16="http://schemas.microsoft.com/office/drawing/2014/main" val="20002"/>
                     </a:ext>
                   </a:extLst>
                 </a:gridCol>
                 <a:gridCol w="1944216">
                   <a:extLst>
                     <a:ext uri="{9D8B030D-6E8A-4147-A177-3AD203B41FA5}">
-                      <a16:colId xmlns:a16="http://schemas.microsoft.com/office/drawing/2014/main" xmlns="" val="20003"/>
+                      <a16:colId xmlns="" xmlns:a16="http://schemas.microsoft.com/office/drawing/2014/main" val="20003"/>
                     </a:ext>
                   </a:extLst>
                 </a:gridCol>
                 <a:gridCol w="1944216">
                   <a:extLst>
                     <a:ext uri="{9D8B030D-6E8A-4147-A177-3AD203B41FA5}">
-                      <a16:colId xmlns:a16="http://schemas.microsoft.com/office/drawing/2014/main" xmlns="" val="20004"/>
+                      <a16:colId xmlns="" xmlns:a16="http://schemas.microsoft.com/office/drawing/2014/main" val="20004"/>
                     </a:ext>
                   </a:extLst>
                 </a:gridCol>
                 <a:gridCol w="1935073">
                   <a:extLst>
                     <a:ext uri="{9D8B030D-6E8A-4147-A177-3AD203B41FA5}">
-                      <a16:colId xmlns:a16="http://schemas.microsoft.com/office/drawing/2014/main" xmlns="" val="20005"/>
+                      <a16:colId xmlns="" xmlns:a16="http://schemas.microsoft.com/office/drawing/2014/main" val="20005"/>
                     </a:ext>
                   </a:extLst>
                 </a:gridCol>
@@ -19689,7 +19683,7 @@
                 </a:tc>
                 <a:extLst>
                   <a:ext uri="{0D108BD9-81ED-4DB2-BD59-A6C34878D82A}">
-                    <a16:rowId xmlns:a16="http://schemas.microsoft.com/office/drawing/2014/main" xmlns="" val="10000"/>
+                    <a16:rowId xmlns="" xmlns:a16="http://schemas.microsoft.com/office/drawing/2014/main" val="10000"/>
                   </a:ext>
                 </a:extLst>
               </a:tr>
@@ -19999,7 +19993,7 @@
                 </a:tc>
                 <a:extLst>
                   <a:ext uri="{0D108BD9-81ED-4DB2-BD59-A6C34878D82A}">
-                    <a16:rowId xmlns:a16="http://schemas.microsoft.com/office/drawing/2014/main" xmlns="" val="10001"/>
+                    <a16:rowId xmlns="" xmlns:a16="http://schemas.microsoft.com/office/drawing/2014/main" val="10001"/>
                   </a:ext>
                 </a:extLst>
               </a:tr>
@@ -20309,7 +20303,7 @@
                 </a:tc>
                 <a:extLst>
                   <a:ext uri="{0D108BD9-81ED-4DB2-BD59-A6C34878D82A}">
-                    <a16:rowId xmlns:a16="http://schemas.microsoft.com/office/drawing/2014/main" xmlns="" val="10002"/>
+                    <a16:rowId xmlns="" xmlns:a16="http://schemas.microsoft.com/office/drawing/2014/main" val="10002"/>
                   </a:ext>
                 </a:extLst>
               </a:tr>
@@ -20619,7 +20613,7 @@
                 </a:tc>
                 <a:extLst>
                   <a:ext uri="{0D108BD9-81ED-4DB2-BD59-A6C34878D82A}">
-                    <a16:rowId xmlns:a16="http://schemas.microsoft.com/office/drawing/2014/main" xmlns="" val="10003"/>
+                    <a16:rowId xmlns="" xmlns:a16="http://schemas.microsoft.com/office/drawing/2014/main" val="10003"/>
                   </a:ext>
                 </a:extLst>
               </a:tr>
@@ -20929,7 +20923,7 @@
                 </a:tc>
                 <a:extLst>
                   <a:ext uri="{0D108BD9-81ED-4DB2-BD59-A6C34878D82A}">
-                    <a16:rowId xmlns:a16="http://schemas.microsoft.com/office/drawing/2014/main" xmlns="" val="10004"/>
+                    <a16:rowId xmlns="" xmlns:a16="http://schemas.microsoft.com/office/drawing/2014/main" val="10004"/>
                   </a:ext>
                 </a:extLst>
               </a:tr>
@@ -20942,7 +20936,7 @@
           <p:cNvPr id="20" name="テキスト ボックス 19">
             <a:extLst>
               <a:ext uri="{FF2B5EF4-FFF2-40B4-BE49-F238E27FC236}">
-                <a16:creationId xmlns:a16="http://schemas.microsoft.com/office/drawing/2014/main" xmlns="" id="{093C528F-2820-7842-B097-0CEA13538469}"/>
+                <a16:creationId xmlns="" xmlns:a16="http://schemas.microsoft.com/office/drawing/2014/main" id="{093C528F-2820-7842-B097-0CEA13538469}"/>
               </a:ext>
             </a:extLst>
           </p:cNvPr>
@@ -20968,11 +20962,7 @@
             <a:pPr algn="ctr"/>
             <a:r>
               <a:rPr kumimoji="1" lang="en-US" altLang="ja-JP" u="sng" dirty="0" smtClean="0"/>
-              <a:t>Rate</a:t>
-            </a:r>
-            <a:r>
-              <a:rPr kumimoji="1" lang="en-US" altLang="ja-JP" u="sng" dirty="0" smtClean="0"/>
-              <a:t> </a:t>
+              <a:t>Rate </a:t>
             </a:r>
             <a:r>
               <a:rPr kumimoji="1" lang="en-US" altLang="ja-JP" u="sng" dirty="0"/>
@@ -21022,21 +21012,21 @@
                 <a:gridCol w="1945280">
                   <a:extLst>
                     <a:ext uri="{9D8B030D-6E8A-4147-A177-3AD203B41FA5}">
-                      <a16:colId xmlns:a16="http://schemas.microsoft.com/office/drawing/2014/main" xmlns="" val="20000"/>
+                      <a16:colId xmlns="" xmlns:a16="http://schemas.microsoft.com/office/drawing/2014/main" val="20000"/>
                     </a:ext>
                   </a:extLst>
                 </a:gridCol>
                 <a:gridCol w="1945280">
                   <a:extLst>
                     <a:ext uri="{9D8B030D-6E8A-4147-A177-3AD203B41FA5}">
-                      <a16:colId xmlns:a16="http://schemas.microsoft.com/office/drawing/2014/main" xmlns="" val="20001"/>
+                      <a16:colId xmlns="" xmlns:a16="http://schemas.microsoft.com/office/drawing/2014/main" val="20001"/>
                     </a:ext>
                   </a:extLst>
                 </a:gridCol>
                 <a:gridCol w="1945280">
                   <a:extLst>
                     <a:ext uri="{9D8B030D-6E8A-4147-A177-3AD203B41FA5}">
-                      <a16:colId xmlns:a16="http://schemas.microsoft.com/office/drawing/2014/main" xmlns="" val="20002"/>
+                      <a16:colId xmlns="" xmlns:a16="http://schemas.microsoft.com/office/drawing/2014/main" val="20002"/>
                     </a:ext>
                   </a:extLst>
                 </a:gridCol>
@@ -21122,7 +21112,7 @@
                 </a:tc>
                 <a:extLst>
                   <a:ext uri="{0D108BD9-81ED-4DB2-BD59-A6C34878D82A}">
-                    <a16:rowId xmlns:a16="http://schemas.microsoft.com/office/drawing/2014/main" xmlns="" val="10000"/>
+                    <a16:rowId xmlns="" xmlns:a16="http://schemas.microsoft.com/office/drawing/2014/main" val="10000"/>
                   </a:ext>
                 </a:extLst>
               </a:tr>
@@ -21347,7 +21337,7 @@
                 </a:tc>
                 <a:extLst>
                   <a:ext uri="{0D108BD9-81ED-4DB2-BD59-A6C34878D82A}">
-                    <a16:rowId xmlns:a16="http://schemas.microsoft.com/office/drawing/2014/main" xmlns="" val="10001"/>
+                    <a16:rowId xmlns="" xmlns:a16="http://schemas.microsoft.com/office/drawing/2014/main" val="10001"/>
                   </a:ext>
                 </a:extLst>
               </a:tr>
@@ -21871,8 +21861,8 @@
           </a:p>
         </p:txBody>
       </p:sp>
-      <mc:AlternateContent xmlns:mc="http://schemas.openxmlformats.org/markup-compatibility/2006">
-        <mc:Choice xmlns:a14="http://schemas.microsoft.com/office/drawing/2010/main" Requires="a14">
+      <mc:AlternateContent xmlns:mc="http://schemas.openxmlformats.org/markup-compatibility/2006" xmlns:a14="http://schemas.microsoft.com/office/drawing/2010/main">
+        <mc:Choice Requires="a14">
           <p:graphicFrame>
             <p:nvGraphicFramePr>
               <p:cNvPr id="9" name="表 8"/>
@@ -21901,14 +21891,14 @@
                     <a:gridCol w="3744416">
                       <a:extLst>
                         <a:ext uri="{9D8B030D-6E8A-4147-A177-3AD203B41FA5}">
-                          <a16:colId xmlns:a16="http://schemas.microsoft.com/office/drawing/2014/main" xmlns="" val="20000"/>
+                          <a16:colId xmlns="" xmlns:a16="http://schemas.microsoft.com/office/drawing/2014/main" val="20000"/>
                         </a:ext>
                       </a:extLst>
                     </a:gridCol>
                     <a:gridCol w="3744416">
                       <a:extLst>
                         <a:ext uri="{9D8B030D-6E8A-4147-A177-3AD203B41FA5}">
-                          <a16:colId xmlns:a16="http://schemas.microsoft.com/office/drawing/2014/main" xmlns="" val="20001"/>
+                          <a16:colId xmlns="" xmlns:a16="http://schemas.microsoft.com/office/drawing/2014/main" val="20001"/>
                         </a:ext>
                       </a:extLst>
                     </a:gridCol>
@@ -21954,7 +21944,7 @@
                     </a:tc>
                     <a:extLst>
                       <a:ext uri="{0D108BD9-81ED-4DB2-BD59-A6C34878D82A}">
-                        <a16:rowId xmlns:a16="http://schemas.microsoft.com/office/drawing/2014/main" xmlns="" val="10000"/>
+                        <a16:rowId xmlns="" xmlns:a16="http://schemas.microsoft.com/office/drawing/2014/main" val="10000"/>
                       </a:ext>
                     </a:extLst>
                   </a:tr>
@@ -22068,7 +22058,7 @@
                     </a:tc>
                     <a:extLst>
                       <a:ext uri="{0D108BD9-81ED-4DB2-BD59-A6C34878D82A}">
-                        <a16:rowId xmlns:a16="http://schemas.microsoft.com/office/drawing/2014/main" xmlns="" val="10001"/>
+                        <a16:rowId xmlns="" xmlns:a16="http://schemas.microsoft.com/office/drawing/2014/main" val="10001"/>
                       </a:ext>
                     </a:extLst>
                   </a:tr>
@@ -22143,7 +22133,7 @@
                     </a:tc>
                     <a:extLst>
                       <a:ext uri="{0D108BD9-81ED-4DB2-BD59-A6C34878D82A}">
-                        <a16:rowId xmlns:a16="http://schemas.microsoft.com/office/drawing/2014/main" xmlns="" val="10002"/>
+                        <a16:rowId xmlns="" xmlns:a16="http://schemas.microsoft.com/office/drawing/2014/main" val="10002"/>
                       </a:ext>
                     </a:extLst>
                   </a:tr>
@@ -22196,7 +22186,7 @@
                     </a:tc>
                     <a:extLst>
                       <a:ext uri="{0D108BD9-81ED-4DB2-BD59-A6C34878D82A}">
-                        <a16:rowId xmlns:a16="http://schemas.microsoft.com/office/drawing/2014/main" xmlns="" val="10003"/>
+                        <a16:rowId xmlns="" xmlns:a16="http://schemas.microsoft.com/office/drawing/2014/main" val="10003"/>
                       </a:ext>
                     </a:extLst>
                   </a:tr>
@@ -22271,7 +22261,7 @@
                     </a:tc>
                     <a:extLst>
                       <a:ext uri="{0D108BD9-81ED-4DB2-BD59-A6C34878D82A}">
-                        <a16:rowId xmlns:a16="http://schemas.microsoft.com/office/drawing/2014/main" xmlns="" val="10004"/>
+                        <a16:rowId xmlns="" xmlns:a16="http://schemas.microsoft.com/office/drawing/2014/main" val="10004"/>
                       </a:ext>
                     </a:extLst>
                   </a:tr>
@@ -22346,7 +22336,7 @@
                     </a:tc>
                     <a:extLst>
                       <a:ext uri="{0D108BD9-81ED-4DB2-BD59-A6C34878D82A}">
-                        <a16:rowId xmlns:a16="http://schemas.microsoft.com/office/drawing/2014/main" xmlns="" val="10005"/>
+                        <a16:rowId xmlns="" xmlns:a16="http://schemas.microsoft.com/office/drawing/2014/main" val="10005"/>
                       </a:ext>
                     </a:extLst>
                   </a:tr>
@@ -22415,7 +22405,7 @@
                     </a:tc>
                     <a:extLst>
                       <a:ext uri="{0D108BD9-81ED-4DB2-BD59-A6C34878D82A}">
-                        <a16:rowId xmlns:a16="http://schemas.microsoft.com/office/drawing/2014/main" xmlns="" val="10006"/>
+                        <a16:rowId xmlns="" xmlns:a16="http://schemas.microsoft.com/office/drawing/2014/main" val="10006"/>
                       </a:ext>
                     </a:extLst>
                   </a:tr>
@@ -22478,7 +22468,7 @@
                     </a:tc>
                     <a:extLst>
                       <a:ext uri="{0D108BD9-81ED-4DB2-BD59-A6C34878D82A}">
-                        <a16:rowId xmlns:a16="http://schemas.microsoft.com/office/drawing/2014/main" xmlns="" val="10007"/>
+                        <a16:rowId xmlns="" xmlns:a16="http://schemas.microsoft.com/office/drawing/2014/main" val="10007"/>
                       </a:ext>
                     </a:extLst>
                   </a:tr>
@@ -22569,7 +22559,7 @@
                     </a:tc>
                     <a:extLst>
                       <a:ext uri="{0D108BD9-81ED-4DB2-BD59-A6C34878D82A}">
-                        <a16:rowId xmlns:a16="http://schemas.microsoft.com/office/drawing/2014/main" xmlns="" val="10008"/>
+                        <a16:rowId xmlns="" xmlns:a16="http://schemas.microsoft.com/office/drawing/2014/main" val="10008"/>
                       </a:ext>
                     </a:extLst>
                   </a:tr>
@@ -22578,7 +22568,7 @@
             </a:graphic>
           </p:graphicFrame>
         </mc:Choice>
-        <mc:Fallback>
+        <mc:Fallback xmlns="">
           <p:graphicFrame>
             <p:nvGraphicFramePr>
               <p:cNvPr id="9" name="表 8"/>
@@ -23331,7 +23321,7 @@
           <p:nvPr>
             <p:extLst>
               <p:ext uri="{D42A27DB-BD31-4B8C-83A1-F6EECF244321}">
-                <p14:modId xmlns:p14="http://schemas.microsoft.com/office/powerpoint/2010/main" val="3418826722"/>
+                <p14:modId xmlns:p14="http://schemas.microsoft.com/office/powerpoint/2010/main" val="1614452101"/>
               </p:ext>
             </p:extLst>
           </p:nvPr>
@@ -23350,14 +23340,14 @@
                 <a:gridCol w="3960440">
                   <a:extLst>
                     <a:ext uri="{9D8B030D-6E8A-4147-A177-3AD203B41FA5}">
-                      <a16:colId xmlns:a16="http://schemas.microsoft.com/office/drawing/2014/main" xmlns="" val="20000"/>
+                      <a16:colId xmlns="" xmlns:a16="http://schemas.microsoft.com/office/drawing/2014/main" val="20000"/>
                     </a:ext>
                   </a:extLst>
                 </a:gridCol>
                 <a:gridCol w="3960440">
                   <a:extLst>
                     <a:ext uri="{9D8B030D-6E8A-4147-A177-3AD203B41FA5}">
-                      <a16:colId xmlns:a16="http://schemas.microsoft.com/office/drawing/2014/main" xmlns="" val="20001"/>
+                      <a16:colId xmlns="" xmlns:a16="http://schemas.microsoft.com/office/drawing/2014/main" val="20001"/>
                     </a:ext>
                   </a:extLst>
                 </a:gridCol>
@@ -23475,7 +23465,7 @@
                 </a:tc>
                 <a:extLst>
                   <a:ext uri="{0D108BD9-81ED-4DB2-BD59-A6C34878D82A}">
-                    <a16:rowId xmlns:a16="http://schemas.microsoft.com/office/drawing/2014/main" xmlns="" val="10000"/>
+                    <a16:rowId xmlns="" xmlns:a16="http://schemas.microsoft.com/office/drawing/2014/main" val="10000"/>
                   </a:ext>
                 </a:extLst>
               </a:tr>
@@ -23639,7 +23629,7 @@
                 </a:tc>
                 <a:extLst>
                   <a:ext uri="{0D108BD9-81ED-4DB2-BD59-A6C34878D82A}">
-                    <a16:rowId xmlns:a16="http://schemas.microsoft.com/office/drawing/2014/main" xmlns="" val="10001"/>
+                    <a16:rowId xmlns="" xmlns:a16="http://schemas.microsoft.com/office/drawing/2014/main" val="10001"/>
                   </a:ext>
                 </a:extLst>
               </a:tr>
@@ -23700,7 +23690,7 @@
                 </a:tc>
                 <a:extLst>
                   <a:ext uri="{0D108BD9-81ED-4DB2-BD59-A6C34878D82A}">
-                    <a16:rowId xmlns:a16="http://schemas.microsoft.com/office/drawing/2014/main" xmlns="" val="10002"/>
+                    <a16:rowId xmlns="" xmlns:a16="http://schemas.microsoft.com/office/drawing/2014/main" val="10002"/>
                   </a:ext>
                 </a:extLst>
               </a:tr>
@@ -23761,7 +23751,7 @@
                 </a:tc>
                 <a:extLst>
                   <a:ext uri="{0D108BD9-81ED-4DB2-BD59-A6C34878D82A}">
-                    <a16:rowId xmlns:a16="http://schemas.microsoft.com/office/drawing/2014/main" xmlns="" val="10003"/>
+                    <a16:rowId xmlns="" xmlns:a16="http://schemas.microsoft.com/office/drawing/2014/main" val="10003"/>
                   </a:ext>
                 </a:extLst>
               </a:tr>
@@ -23830,7 +23820,7 @@
                 </a:tc>
                 <a:extLst>
                   <a:ext uri="{0D108BD9-81ED-4DB2-BD59-A6C34878D82A}">
-                    <a16:rowId xmlns:a16="http://schemas.microsoft.com/office/drawing/2014/main" xmlns="" val="10004"/>
+                    <a16:rowId xmlns="" xmlns:a16="http://schemas.microsoft.com/office/drawing/2014/main" val="10004"/>
                   </a:ext>
                 </a:extLst>
               </a:tr>
@@ -23921,7 +23911,7 @@
                 </a:tc>
                 <a:extLst>
                   <a:ext uri="{0D108BD9-81ED-4DB2-BD59-A6C34878D82A}">
-                    <a16:rowId xmlns:a16="http://schemas.microsoft.com/office/drawing/2014/main" xmlns="" val="10005"/>
+                    <a16:rowId xmlns="" xmlns:a16="http://schemas.microsoft.com/office/drawing/2014/main" val="10005"/>
                   </a:ext>
                 </a:extLst>
               </a:tr>
@@ -23962,6 +23952,28 @@
                     <a:p>
                       <a:pPr algn="l" fontAlgn="ctr"/>
                       <a:r>
+                        <a:rPr lang="en-US" sz="1100" b="0" i="0" u="none" strike="noStrike">
+                          <a:solidFill>
+                            <a:srgbClr val="000000"/>
+                          </a:solidFill>
+                          <a:effectLst/>
+                          <a:latin typeface="+mn-lt"/>
+                          <a:ea typeface="ＭＳ Ｐゴシック" panose="020B0600070205080204" pitchFamily="50" charset="-128"/>
+                        </a:rPr>
+                        <a:t> </a:t>
+                      </a:r>
+                      <a:r>
+                        <a:rPr lang="en-US" sz="1100" b="0" i="0" u="none" strike="noStrike" smtClean="0">
+                          <a:solidFill>
+                            <a:srgbClr val="000000"/>
+                          </a:solidFill>
+                          <a:effectLst/>
+                          <a:latin typeface="+mn-lt"/>
+                          <a:ea typeface="ＭＳ Ｐゴシック" panose="020B0600070205080204" pitchFamily="50" charset="-128"/>
+                        </a:rPr>
+                        <a:t>0.24 </a:t>
+                      </a:r>
+                      <a:r>
                         <a:rPr lang="en-US" sz="1100" b="0" i="0" u="none" strike="noStrike" dirty="0">
                           <a:solidFill>
                             <a:srgbClr val="000000"/>
@@ -23970,7 +23982,7 @@
                           <a:latin typeface="+mn-lt"/>
                           <a:ea typeface="ＭＳ Ｐゴシック" panose="020B0600070205080204" pitchFamily="50" charset="-128"/>
                         </a:rPr>
-                        <a:t> 0.2 [s]</a:t>
+                        <a:t>[s]</a:t>
                       </a:r>
                     </a:p>
                   </a:txBody>
@@ -23982,7 +23994,7 @@
                 </a:tc>
                 <a:extLst>
                   <a:ext uri="{0D108BD9-81ED-4DB2-BD59-A6C34878D82A}">
-                    <a16:rowId xmlns:a16="http://schemas.microsoft.com/office/drawing/2014/main" xmlns="" val="10006"/>
+                    <a16:rowId xmlns="" xmlns:a16="http://schemas.microsoft.com/office/drawing/2014/main" val="10006"/>
                   </a:ext>
                 </a:extLst>
               </a:tr>
@@ -24018,14 +24030,14 @@
                 <a:gridCol w="3960440">
                   <a:extLst>
                     <a:ext uri="{9D8B030D-6E8A-4147-A177-3AD203B41FA5}">
-                      <a16:colId xmlns:a16="http://schemas.microsoft.com/office/drawing/2014/main" xmlns="" val="20000"/>
+                      <a16:colId xmlns="" xmlns:a16="http://schemas.microsoft.com/office/drawing/2014/main" val="20000"/>
                     </a:ext>
                   </a:extLst>
                 </a:gridCol>
                 <a:gridCol w="3960440">
                   <a:extLst>
                     <a:ext uri="{9D8B030D-6E8A-4147-A177-3AD203B41FA5}">
-                      <a16:colId xmlns:a16="http://schemas.microsoft.com/office/drawing/2014/main" xmlns="" val="20001"/>
+                      <a16:colId xmlns="" xmlns:a16="http://schemas.microsoft.com/office/drawing/2014/main" val="20001"/>
                     </a:ext>
                   </a:extLst>
                 </a:gridCol>
@@ -24089,7 +24101,7 @@
                 </a:tc>
                 <a:extLst>
                   <a:ext uri="{0D108BD9-81ED-4DB2-BD59-A6C34878D82A}">
-                    <a16:rowId xmlns:a16="http://schemas.microsoft.com/office/drawing/2014/main" xmlns="" val="10000"/>
+                    <a16:rowId xmlns="" xmlns:a16="http://schemas.microsoft.com/office/drawing/2014/main" val="10000"/>
                   </a:ext>
                 </a:extLst>
               </a:tr>
@@ -24152,7 +24164,7 @@
                 </a:tc>
                 <a:extLst>
                   <a:ext uri="{0D108BD9-81ED-4DB2-BD59-A6C34878D82A}">
-                    <a16:rowId xmlns:a16="http://schemas.microsoft.com/office/drawing/2014/main" xmlns="" val="10001"/>
+                    <a16:rowId xmlns="" xmlns:a16="http://schemas.microsoft.com/office/drawing/2014/main" val="10001"/>
                   </a:ext>
                 </a:extLst>
               </a:tr>
@@ -24223,7 +24235,7 @@
                 </a:tc>
                 <a:extLst>
                   <a:ext uri="{0D108BD9-81ED-4DB2-BD59-A6C34878D82A}">
-                    <a16:rowId xmlns:a16="http://schemas.microsoft.com/office/drawing/2014/main" xmlns="" val="10002"/>
+                    <a16:rowId xmlns="" xmlns:a16="http://schemas.microsoft.com/office/drawing/2014/main" val="10002"/>
                   </a:ext>
                 </a:extLst>
               </a:tr>
@@ -24894,7 +24906,7 @@
           <p:cNvPr id="5" name="正方形/長方形 4">
             <a:extLst>
               <a:ext uri="{FF2B5EF4-FFF2-40B4-BE49-F238E27FC236}">
-                <a16:creationId xmlns:a16="http://schemas.microsoft.com/office/drawing/2014/main" xmlns="" id="{24BDBAAB-565F-544E-8F79-2E06B1AC400F}"/>
+                <a16:creationId xmlns="" xmlns:a16="http://schemas.microsoft.com/office/drawing/2014/main" id="{24BDBAAB-565F-544E-8F79-2E06B1AC400F}"/>
               </a:ext>
             </a:extLst>
           </p:cNvPr>
@@ -24948,7 +24960,7 @@
           <p:cNvPr id="3" name="コンテンツ プレースホルダー 2">
             <a:extLst>
               <a:ext uri="{FF2B5EF4-FFF2-40B4-BE49-F238E27FC236}">
-                <a16:creationId xmlns:a16="http://schemas.microsoft.com/office/drawing/2014/main" xmlns="" id="{57201CEF-5B54-EC41-97DF-2A5FDA9A8199}"/>
+                <a16:creationId xmlns="" xmlns:a16="http://schemas.microsoft.com/office/drawing/2014/main" id="{57201CEF-5B54-EC41-97DF-2A5FDA9A8199}"/>
               </a:ext>
             </a:extLst>
           </p:cNvPr>
@@ -25109,28 +25121,28 @@
                 <a:gridCol w="1980220">
                   <a:extLst>
                     <a:ext uri="{9D8B030D-6E8A-4147-A177-3AD203B41FA5}">
-                      <a16:colId xmlns:a16="http://schemas.microsoft.com/office/drawing/2014/main" xmlns="" val="20000"/>
+                      <a16:colId xmlns="" xmlns:a16="http://schemas.microsoft.com/office/drawing/2014/main" val="20000"/>
                     </a:ext>
                   </a:extLst>
                 </a:gridCol>
                 <a:gridCol w="1980220">
                   <a:extLst>
                     <a:ext uri="{9D8B030D-6E8A-4147-A177-3AD203B41FA5}">
-                      <a16:colId xmlns:a16="http://schemas.microsoft.com/office/drawing/2014/main" xmlns="" val="20001"/>
+                      <a16:colId xmlns="" xmlns:a16="http://schemas.microsoft.com/office/drawing/2014/main" val="20001"/>
                     </a:ext>
                   </a:extLst>
                 </a:gridCol>
                 <a:gridCol w="1980220">
                   <a:extLst>
                     <a:ext uri="{9D8B030D-6E8A-4147-A177-3AD203B41FA5}">
-                      <a16:colId xmlns:a16="http://schemas.microsoft.com/office/drawing/2014/main" xmlns="" val="20002"/>
+                      <a16:colId xmlns="" xmlns:a16="http://schemas.microsoft.com/office/drawing/2014/main" val="20002"/>
                     </a:ext>
                   </a:extLst>
                 </a:gridCol>
                 <a:gridCol w="1980220">
                   <a:extLst>
                     <a:ext uri="{9D8B030D-6E8A-4147-A177-3AD203B41FA5}">
-                      <a16:colId xmlns:a16="http://schemas.microsoft.com/office/drawing/2014/main" xmlns="" val="20003"/>
+                      <a16:colId xmlns="" xmlns:a16="http://schemas.microsoft.com/office/drawing/2014/main" val="20003"/>
                     </a:ext>
                   </a:extLst>
                 </a:gridCol>
@@ -25247,7 +25259,7 @@
                 </a:tc>
                 <a:extLst>
                   <a:ext uri="{0D108BD9-81ED-4DB2-BD59-A6C34878D82A}">
-                    <a16:rowId xmlns:a16="http://schemas.microsoft.com/office/drawing/2014/main" xmlns="" val="10000"/>
+                    <a16:rowId xmlns="" xmlns:a16="http://schemas.microsoft.com/office/drawing/2014/main" val="10000"/>
                   </a:ext>
                 </a:extLst>
               </a:tr>
@@ -25409,7 +25421,7 @@
                 </a:tc>
                 <a:extLst>
                   <a:ext uri="{0D108BD9-81ED-4DB2-BD59-A6C34878D82A}">
-                    <a16:rowId xmlns:a16="http://schemas.microsoft.com/office/drawing/2014/main" xmlns="" val="10001"/>
+                    <a16:rowId xmlns="" xmlns:a16="http://schemas.microsoft.com/office/drawing/2014/main" val="10001"/>
                   </a:ext>
                 </a:extLst>
               </a:tr>
@@ -25634,7 +25646,7 @@
           <p:cNvPr id="8" name="テキスト ボックス 7">
             <a:extLst>
               <a:ext uri="{FF2B5EF4-FFF2-40B4-BE49-F238E27FC236}">
-                <a16:creationId xmlns:a16="http://schemas.microsoft.com/office/drawing/2014/main" xmlns="" id="{093C528F-2820-7842-B097-0CEA13538469}"/>
+                <a16:creationId xmlns="" xmlns:a16="http://schemas.microsoft.com/office/drawing/2014/main" id="{093C528F-2820-7842-B097-0CEA13538469}"/>
               </a:ext>
             </a:extLst>
           </p:cNvPr>
@@ -25881,7 +25893,7 @@
           <p:cNvPr id="8" name="テキスト ボックス 7">
             <a:extLst>
               <a:ext uri="{FF2B5EF4-FFF2-40B4-BE49-F238E27FC236}">
-                <a16:creationId xmlns:a16="http://schemas.microsoft.com/office/drawing/2014/main" xmlns="" id="{093C528F-2820-7842-B097-0CEA13538469}"/>
+                <a16:creationId xmlns="" xmlns:a16="http://schemas.microsoft.com/office/drawing/2014/main" id="{093C528F-2820-7842-B097-0CEA13538469}"/>
               </a:ext>
             </a:extLst>
           </p:cNvPr>

</xml_diff>